<commit_message>
update chart and figure
</commit_message>
<xml_diff>
--- a/Prototype graph.pptx
+++ b/Prototype graph.pptx
@@ -261,7 +261,7 @@
           <a:p>
             <a:fld id="{322350AB-4051-884C-931B-507D634D2662}" type="datetimeFigureOut">
               <a:rPr lang="en-US" smtClean="0"/>
-              <a:t>12/10/19</a:t>
+              <a:t>12/11/19</a:t>
             </a:fld>
             <a:endParaRPr lang="en-US"/>
           </a:p>
@@ -459,7 +459,7 @@
           <a:p>
             <a:fld id="{322350AB-4051-884C-931B-507D634D2662}" type="datetimeFigureOut">
               <a:rPr lang="en-US" smtClean="0"/>
-              <a:t>12/10/19</a:t>
+              <a:t>12/11/19</a:t>
             </a:fld>
             <a:endParaRPr lang="en-US"/>
           </a:p>
@@ -667,7 +667,7 @@
           <a:p>
             <a:fld id="{322350AB-4051-884C-931B-507D634D2662}" type="datetimeFigureOut">
               <a:rPr lang="en-US" smtClean="0"/>
-              <a:t>12/10/19</a:t>
+              <a:t>12/11/19</a:t>
             </a:fld>
             <a:endParaRPr lang="en-US"/>
           </a:p>
@@ -865,7 +865,7 @@
           <a:p>
             <a:fld id="{322350AB-4051-884C-931B-507D634D2662}" type="datetimeFigureOut">
               <a:rPr lang="en-US" smtClean="0"/>
-              <a:t>12/10/19</a:t>
+              <a:t>12/11/19</a:t>
             </a:fld>
             <a:endParaRPr lang="en-US"/>
           </a:p>
@@ -1140,7 +1140,7 @@
           <a:p>
             <a:fld id="{322350AB-4051-884C-931B-507D634D2662}" type="datetimeFigureOut">
               <a:rPr lang="en-US" smtClean="0"/>
-              <a:t>12/10/19</a:t>
+              <a:t>12/11/19</a:t>
             </a:fld>
             <a:endParaRPr lang="en-US"/>
           </a:p>
@@ -1405,7 +1405,7 @@
           <a:p>
             <a:fld id="{322350AB-4051-884C-931B-507D634D2662}" type="datetimeFigureOut">
               <a:rPr lang="en-US" smtClean="0"/>
-              <a:t>12/10/19</a:t>
+              <a:t>12/11/19</a:t>
             </a:fld>
             <a:endParaRPr lang="en-US"/>
           </a:p>
@@ -1817,7 +1817,7 @@
           <a:p>
             <a:fld id="{322350AB-4051-884C-931B-507D634D2662}" type="datetimeFigureOut">
               <a:rPr lang="en-US" smtClean="0"/>
-              <a:t>12/10/19</a:t>
+              <a:t>12/11/19</a:t>
             </a:fld>
             <a:endParaRPr lang="en-US"/>
           </a:p>
@@ -1958,7 +1958,7 @@
           <a:p>
             <a:fld id="{322350AB-4051-884C-931B-507D634D2662}" type="datetimeFigureOut">
               <a:rPr lang="en-US" smtClean="0"/>
-              <a:t>12/10/19</a:t>
+              <a:t>12/11/19</a:t>
             </a:fld>
             <a:endParaRPr lang="en-US"/>
           </a:p>
@@ -2071,7 +2071,7 @@
           <a:p>
             <a:fld id="{322350AB-4051-884C-931B-507D634D2662}" type="datetimeFigureOut">
               <a:rPr lang="en-US" smtClean="0"/>
-              <a:t>12/10/19</a:t>
+              <a:t>12/11/19</a:t>
             </a:fld>
             <a:endParaRPr lang="en-US"/>
           </a:p>
@@ -2382,7 +2382,7 @@
           <a:p>
             <a:fld id="{322350AB-4051-884C-931B-507D634D2662}" type="datetimeFigureOut">
               <a:rPr lang="en-US" smtClean="0"/>
-              <a:t>12/10/19</a:t>
+              <a:t>12/11/19</a:t>
             </a:fld>
             <a:endParaRPr lang="en-US"/>
           </a:p>
@@ -2670,7 +2670,7 @@
           <a:p>
             <a:fld id="{322350AB-4051-884C-931B-507D634D2662}" type="datetimeFigureOut">
               <a:rPr lang="en-US" smtClean="0"/>
-              <a:t>12/10/19</a:t>
+              <a:t>12/11/19</a:t>
             </a:fld>
             <a:endParaRPr lang="en-US"/>
           </a:p>
@@ -2911,7 +2911,7 @@
           <a:p>
             <a:fld id="{322350AB-4051-884C-931B-507D634D2662}" type="datetimeFigureOut">
               <a:rPr lang="en-US" smtClean="0"/>
-              <a:t>12/10/19</a:t>
+              <a:t>12/11/19</a:t>
             </a:fld>
             <a:endParaRPr lang="en-US"/>
           </a:p>
@@ -4884,7 +4884,7 @@
                 <a:ea typeface="Helvetica Neue" panose="02000503000000020004" pitchFamily="2" charset="0"/>
                 <a:cs typeface="Helvetica Neue" panose="02000503000000020004" pitchFamily="2" charset="0"/>
               </a:rPr>
-              <a:t>To</a:t>
+              <a:t>to</a:t>
             </a:r>
             <a:r>
               <a:rPr lang="zh-CN" altLang="en-US" dirty="0">
@@ -4906,7 +4906,7 @@
                 <a:ea typeface="Helvetica Neue" panose="02000503000000020004" pitchFamily="2" charset="0"/>
                 <a:cs typeface="Helvetica Neue" panose="02000503000000020004" pitchFamily="2" charset="0"/>
               </a:rPr>
-              <a:t>Automate</a:t>
+              <a:t>automate</a:t>
             </a:r>
             <a:r>
               <a:rPr lang="zh-CN" altLang="en-US" dirty="0">
@@ -4928,7 +4928,7 @@
                 <a:ea typeface="Helvetica Neue" panose="02000503000000020004" pitchFamily="2" charset="0"/>
                 <a:cs typeface="Helvetica Neue" panose="02000503000000020004" pitchFamily="2" charset="0"/>
               </a:rPr>
-              <a:t>Tests</a:t>
+              <a:t>tests</a:t>
             </a:r>
             <a:endParaRPr lang="en-US" dirty="0">
               <a:solidFill>
@@ -5040,7 +5040,7 @@
                 <a:ea typeface="Helvetica Neue" panose="02000503000000020004" pitchFamily="2" charset="0"/>
                 <a:cs typeface="Helvetica Neue" panose="02000503000000020004" pitchFamily="2" charset="0"/>
               </a:rPr>
-              <a:t>Image</a:t>
+              <a:t>image</a:t>
             </a:r>
             <a:r>
               <a:rPr lang="zh-CN" altLang="en-US" dirty="0">
@@ -5061,7 +5061,7 @@
                 <a:ea typeface="Helvetica Neue" panose="02000503000000020004" pitchFamily="2" charset="0"/>
                 <a:cs typeface="Helvetica Neue" panose="02000503000000020004" pitchFamily="2" charset="0"/>
               </a:rPr>
-              <a:t>Search</a:t>
+              <a:t>search</a:t>
             </a:r>
             <a:r>
               <a:rPr lang="zh-CN" altLang="en-US" dirty="0">
@@ -5082,7 +5082,7 @@
                 <a:ea typeface="Helvetica Neue" panose="02000503000000020004" pitchFamily="2" charset="0"/>
                 <a:cs typeface="Helvetica Neue" panose="02000503000000020004" pitchFamily="2" charset="0"/>
               </a:rPr>
-              <a:t>Engine</a:t>
+              <a:t>engine</a:t>
             </a:r>
             <a:endParaRPr lang="en-US" dirty="0">
               <a:solidFill>
@@ -5110,7 +5110,7 @@
         <p:spPr>
           <a:xfrm>
             <a:off x="161363" y="5027730"/>
-            <a:ext cx="1921437" cy="890447"/>
+            <a:ext cx="2046430" cy="1144470"/>
           </a:xfrm>
           <a:prstGeom prst="roundRect">
             <a:avLst/>
@@ -5174,7 +5174,7 @@
                 <a:ea typeface="Helvetica Neue" panose="02000503000000020004" pitchFamily="2" charset="0"/>
                 <a:cs typeface="Helvetica Neue" panose="02000503000000020004" pitchFamily="2" charset="0"/>
               </a:rPr>
-              <a:t>From</a:t>
+              <a:t>from</a:t>
             </a:r>
             <a:r>
               <a:rPr lang="zh-CN" altLang="en-US" dirty="0">
@@ -5194,7 +5194,7 @@
                 <a:latin typeface="Helvetica Neue" panose="02000503000000020004" pitchFamily="2" charset="0"/>
                 <a:cs typeface="Helvetica Neue" panose="02000503000000020004" pitchFamily="2" charset="0"/>
               </a:rPr>
-              <a:t>Academic</a:t>
+              <a:t>academic</a:t>
             </a:r>
             <a:r>
               <a:rPr lang="zh-CN" altLang="en-US" dirty="0">
@@ -5215,7 +5215,7 @@
                 <a:ea typeface="Helvetica Neue" panose="02000503000000020004" pitchFamily="2" charset="0"/>
                 <a:cs typeface="Helvetica Neue" panose="02000503000000020004" pitchFamily="2" charset="0"/>
               </a:rPr>
-              <a:t>Papers</a:t>
+              <a:t>papers</a:t>
             </a:r>
             <a:endParaRPr lang="en-US" dirty="0">
               <a:solidFill>
@@ -5439,7 +5439,7 @@
                 <a:ea typeface="Helvetica Neue" panose="02000503000000020004" pitchFamily="2" charset="0"/>
                 <a:cs typeface="Helvetica Neue" panose="02000503000000020004" pitchFamily="2" charset="0"/>
               </a:rPr>
-              <a:t>Image</a:t>
+              <a:t>image</a:t>
             </a:r>
             <a:r>
               <a:rPr lang="zh-CN" altLang="en-US" dirty="0">
@@ -5471,7 +5471,7 @@
                 <a:ea typeface="Helvetica Neue" panose="02000503000000020004" pitchFamily="2" charset="0"/>
                 <a:cs typeface="Helvetica Neue" panose="02000503000000020004" pitchFamily="2" charset="0"/>
               </a:rPr>
-              <a:t>Search</a:t>
+              <a:t>search</a:t>
             </a:r>
             <a:r>
               <a:rPr lang="zh-CN" altLang="en-US" dirty="0">
@@ -5492,7 +5492,7 @@
                 <a:ea typeface="Helvetica Neue" panose="02000503000000020004" pitchFamily="2" charset="0"/>
                 <a:cs typeface="Helvetica Neue" panose="02000503000000020004" pitchFamily="2" charset="0"/>
               </a:rPr>
-              <a:t>Engine</a:t>
+              <a:t>engine</a:t>
             </a:r>
             <a:endParaRPr lang="en-US" dirty="0">
               <a:solidFill>
@@ -5604,7 +5604,7 @@
                 <a:ea typeface="Helvetica Neue" panose="02000503000000020004" pitchFamily="2" charset="0"/>
                 <a:cs typeface="Helvetica Neue" panose="02000503000000020004" pitchFamily="2" charset="0"/>
               </a:rPr>
-              <a:t>Image</a:t>
+              <a:t>image</a:t>
             </a:r>
             <a:r>
               <a:rPr lang="zh-CN" altLang="en-US" dirty="0">
@@ -5625,7 +5625,7 @@
                 <a:ea typeface="Helvetica Neue" panose="02000503000000020004" pitchFamily="2" charset="0"/>
                 <a:cs typeface="Helvetica Neue" panose="02000503000000020004" pitchFamily="2" charset="0"/>
               </a:rPr>
-              <a:t>Search</a:t>
+              <a:t>search</a:t>
             </a:r>
             <a:r>
               <a:rPr lang="zh-CN" altLang="en-US" dirty="0">
@@ -5646,7 +5646,7 @@
                 <a:ea typeface="Helvetica Neue" panose="02000503000000020004" pitchFamily="2" charset="0"/>
                 <a:cs typeface="Helvetica Neue" panose="02000503000000020004" pitchFamily="2" charset="0"/>
               </a:rPr>
-              <a:t>Engine</a:t>
+              <a:t>engine</a:t>
             </a:r>
             <a:endParaRPr lang="en-US" dirty="0">
               <a:solidFill>
@@ -5723,8 +5723,8 @@
         </p:nvCxnSpPr>
         <p:spPr>
           <a:xfrm flipV="1">
-            <a:off x="1122082" y="4050506"/>
-            <a:ext cx="289439" cy="977224"/>
+            <a:off x="1184578" y="4050506"/>
+            <a:ext cx="226943" cy="977224"/>
           </a:xfrm>
           <a:prstGeom prst="straightConnector1">
             <a:avLst/>
@@ -6051,7 +6051,29 @@
                 <a:ea typeface="Helvetica Neue" panose="02000503000000020004" pitchFamily="2" charset="0"/>
                 <a:cs typeface="Helvetica Neue" panose="02000503000000020004" pitchFamily="2" charset="0"/>
               </a:rPr>
-              <a:t>Search</a:t>
+              <a:t>image</a:t>
+            </a:r>
+            <a:r>
+              <a:rPr lang="zh-CN" altLang="en-US" dirty="0">
+                <a:solidFill>
+                  <a:schemeClr val="tx1"/>
+                </a:solidFill>
+                <a:latin typeface="Helvetica Neue" panose="02000503000000020004" pitchFamily="2" charset="0"/>
+                <a:ea typeface="Helvetica Neue" panose="02000503000000020004" pitchFamily="2" charset="0"/>
+                <a:cs typeface="Helvetica Neue" panose="02000503000000020004" pitchFamily="2" charset="0"/>
+              </a:rPr>
+              <a:t> </a:t>
+            </a:r>
+            <a:r>
+              <a:rPr lang="en-US" altLang="zh-CN" dirty="0">
+                <a:solidFill>
+                  <a:schemeClr val="tx1"/>
+                </a:solidFill>
+                <a:latin typeface="Helvetica Neue" panose="02000503000000020004" pitchFamily="2" charset="0"/>
+                <a:ea typeface="Helvetica Neue" panose="02000503000000020004" pitchFamily="2" charset="0"/>
+                <a:cs typeface="Helvetica Neue" panose="02000503000000020004" pitchFamily="2" charset="0"/>
+              </a:rPr>
+              <a:t>search</a:t>
             </a:r>
             <a:r>
               <a:rPr lang="zh-CN" altLang="en-US" dirty="0">
@@ -6312,7 +6334,7 @@
                 <a:ea typeface="Helvetica Neue" panose="02000503000000020004" pitchFamily="2" charset="0"/>
                 <a:cs typeface="Helvetica Neue" panose="02000503000000020004" pitchFamily="2" charset="0"/>
               </a:rPr>
-              <a:t>Stereotype</a:t>
+              <a:t>stereotype</a:t>
             </a:r>
             <a:r>
               <a:rPr lang="zh-CN" altLang="en-US" dirty="0">
@@ -6333,7 +6355,7 @@
                 <a:ea typeface="Helvetica Neue" panose="02000503000000020004" pitchFamily="2" charset="0"/>
                 <a:cs typeface="Helvetica Neue" panose="02000503000000020004" pitchFamily="2" charset="0"/>
               </a:rPr>
-              <a:t>Dictionary</a:t>
+              <a:t>dictionary</a:t>
             </a:r>
             <a:r>
               <a:rPr lang="zh-CN" altLang="en-US" dirty="0">
@@ -6481,12 +6503,20 @@
           <a:p>
             <a:pPr algn="ctr"/>
             <a:r>
+              <a:rPr lang="en-US" altLang="zh-CN" dirty="0">
+                <a:solidFill>
+                  <a:schemeClr val="tx1"/>
+                </a:solidFill>
+              </a:rPr>
+              <a:t>R</a:t>
+            </a:r>
+            <a:r>
               <a:rPr lang="en-US" dirty="0">
                 <a:solidFill>
                   <a:schemeClr val="tx1"/>
                 </a:solidFill>
               </a:rPr>
-              <a:t>remove stop words</a:t>
+              <a:t>emove stop words</a:t>
             </a:r>
             <a:endParaRPr lang="en-US" dirty="0">
               <a:solidFill>
@@ -6548,12 +6578,20 @@
           <a:p>
             <a:pPr algn="ctr"/>
             <a:r>
+              <a:rPr lang="en-US" altLang="zh-CN" dirty="0">
+                <a:solidFill>
+                  <a:schemeClr val="tx1"/>
+                </a:solidFill>
+              </a:rPr>
+              <a:t>U</a:t>
+            </a:r>
+            <a:r>
               <a:rPr lang="en-US" dirty="0">
                 <a:solidFill>
                   <a:schemeClr val="tx1"/>
                 </a:solidFill>
               </a:rPr>
-              <a:t>use NLTK pos tag to extract the noun and adjective</a:t>
+              <a:t>se NLTK pos tag to extract the noun and adjective</a:t>
             </a:r>
             <a:endParaRPr lang="en-US" dirty="0">
               <a:solidFill>
@@ -6580,7 +6618,7 @@
         </p:nvSpPr>
         <p:spPr>
           <a:xfrm>
-            <a:off x="3008949" y="4676865"/>
+            <a:off x="1509412" y="4655605"/>
             <a:ext cx="2500313" cy="1243012"/>
           </a:xfrm>
           <a:prstGeom prst="roundRect">
@@ -6813,8 +6851,8 @@
         </p:nvCxnSpPr>
         <p:spPr>
           <a:xfrm flipH="1">
-            <a:off x="5509262" y="5277111"/>
-            <a:ext cx="1910173" cy="21260"/>
+            <a:off x="4009725" y="5277111"/>
+            <a:ext cx="3409710" cy="0"/>
           </a:xfrm>
           <a:prstGeom prst="straightConnector1">
             <a:avLst/>

</xml_diff>